<commit_message>
added script to ppt
</commit_message>
<xml_diff>
--- a/Final Project.pptx
+++ b/Final Project.pptx
@@ -216,7 +216,7 @@
           <a:p>
             <a:fld id="{7B4E3CB4-DE3D-4758-A60E-7210A97E93F2}" type="datetimeFigureOut">
               <a:rPr lang="en-US" smtClean="0"/>
-              <a:t>7/28/2020</a:t>
+              <a:t>7/29/2020</a:t>
             </a:fld>
             <a:endParaRPr lang="en-US"/>
           </a:p>
@@ -280,38 +280,37 @@
           <a:p>
             <a:pPr lvl="0"/>
             <a:r>
-              <a:rPr lang="en-US" smtClean="0"/>
+              <a:rPr lang="en-US"/>
               <a:t>Click to edit Master text styles</a:t>
             </a:r>
           </a:p>
           <a:p>
             <a:pPr lvl="1"/>
             <a:r>
-              <a:rPr lang="en-US" smtClean="0"/>
+              <a:rPr lang="en-US"/>
               <a:t>Second level</a:t>
             </a:r>
           </a:p>
           <a:p>
             <a:pPr lvl="2"/>
             <a:r>
-              <a:rPr lang="en-US" smtClean="0"/>
+              <a:rPr lang="en-US"/>
               <a:t>Third level</a:t>
             </a:r>
           </a:p>
           <a:p>
             <a:pPr lvl="3"/>
             <a:r>
-              <a:rPr lang="en-US" smtClean="0"/>
+              <a:rPr lang="en-US"/>
               <a:t>Fourth level</a:t>
             </a:r>
           </a:p>
           <a:p>
             <a:pPr lvl="4"/>
             <a:r>
-              <a:rPr lang="en-US" smtClean="0"/>
+              <a:rPr lang="en-US"/>
               <a:t>Fifth level</a:t>
             </a:r>
-            <a:endParaRPr lang="en-US"/>
           </a:p>
         </p:txBody>
       </p:sp>
@@ -529,7 +528,7 @@
           <a:lstStyle/>
           <a:p>
             <a:r>
-              <a:rPr lang="en-US" dirty="0" err="1" smtClean="0"/>
+              <a:rPr lang="en-US" dirty="0" err="1"/>
               <a:t>Rimsha</a:t>
             </a:r>
             <a:endParaRPr lang="en-US" dirty="0"/>
@@ -617,10 +616,16 @@
           <a:lstStyle/>
           <a:p>
             <a:r>
-              <a:rPr lang="en-US" dirty="0" err="1" smtClean="0"/>
+              <a:rPr lang="en-US" dirty="0"/>
               <a:t>Rimsha</a:t>
             </a:r>
-            <a:endParaRPr lang="en-US" dirty="0"/>
+            <a:br>
+              <a:rPr lang="en-US" dirty="0"/>
+            </a:br>
+            <a:r>
+              <a:rPr lang="en-US" dirty="0"/>
+              <a:t>CNN stands for Convolutional Neural Network </a:t>
+            </a:r>
           </a:p>
         </p:txBody>
       </p:sp>
@@ -705,9 +710,50 @@
           <a:lstStyle/>
           <a:p>
             <a:r>
-              <a:rPr lang="en-US" dirty="0" err="1" smtClean="0"/>
+              <a:rPr lang="en-US" dirty="0"/>
               <a:t>Rimsha</a:t>
             </a:r>
+          </a:p>
+          <a:p>
+            <a:endParaRPr lang="en-US" dirty="0"/>
+          </a:p>
+          <a:p>
+            <a:r>
+              <a:rPr lang="en-US" dirty="0"/>
+              <a:t>1. Used a data set with 42 classes of cars that contained 60,000 + images of cars from all angles to train multiple models </a:t>
+            </a:r>
+          </a:p>
+          <a:p>
+            <a:r>
+              <a:rPr lang="en-US" dirty="0"/>
+              <a:t>	-training, testing and validation data sets </a:t>
+            </a:r>
+          </a:p>
+          <a:p>
+            <a:r>
+              <a:rPr lang="en-US" dirty="0"/>
+              <a:t>2. Used the previous model to test pictures received through webcam – applying image model to video detection </a:t>
+            </a:r>
+          </a:p>
+          <a:p>
+            <a:r>
+              <a:rPr lang="en-US" dirty="0"/>
+              <a:t>3. Connected Flask app to webpage HTML that would take uploaded images and apply it to our model </a:t>
+            </a:r>
+          </a:p>
+          <a:p>
+            <a:r>
+              <a:rPr lang="en-US" dirty="0"/>
+              <a:t>4. Scraped images from Auto Trader to model for prediction to use as different data set of images – further verify model </a:t>
+            </a:r>
+          </a:p>
+          <a:p>
+            <a:endParaRPr lang="en-US" dirty="0"/>
+          </a:p>
+          <a:p>
+            <a:endParaRPr lang="en-US" dirty="0"/>
+          </a:p>
+          <a:p>
             <a:endParaRPr lang="en-US" dirty="0"/>
           </a:p>
         </p:txBody>
@@ -793,9 +839,44 @@
           <a:lstStyle/>
           <a:p>
             <a:r>
-              <a:rPr lang="en-US" dirty="0" err="1" smtClean="0"/>
+              <a:rPr lang="en-US" dirty="0"/>
               <a:t>Rimsha</a:t>
             </a:r>
+          </a:p>
+          <a:p>
+            <a:endParaRPr lang="en-US" dirty="0"/>
+          </a:p>
+          <a:p>
+            <a:pPr marL="228600" indent="-228600">
+              <a:buAutoNum type="arabicPeriod"/>
+            </a:pPr>
+            <a:r>
+              <a:rPr lang="en-US" dirty="0"/>
+              <a:t>Had low accuracy with 42 classes – think about narrowing scale to 5 or 2 classes </a:t>
+            </a:r>
+          </a:p>
+          <a:p>
+            <a:pPr marL="228600" indent="-228600">
+              <a:buAutoNum type="arabicPeriod"/>
+            </a:pPr>
+            <a:r>
+              <a:rPr lang="en-US" dirty="0"/>
+              <a:t>Had large data set to store – uploading 60,000 to AWS cost Eric 31. cents </a:t>
+            </a:r>
+          </a:p>
+          <a:p>
+            <a:pPr marL="228600" indent="-228600">
+              <a:buAutoNum type="arabicPeriod"/>
+            </a:pPr>
+            <a:r>
+              <a:rPr lang="en-US" dirty="0"/>
+              <a:t>A lot of variance in image size and types of images  </a:t>
+            </a:r>
+          </a:p>
+          <a:p>
+            <a:pPr marL="228600" indent="-228600">
+              <a:buAutoNum type="arabicPeriod"/>
+            </a:pPr>
             <a:endParaRPr lang="en-US" dirty="0"/>
           </a:p>
         </p:txBody>
@@ -881,10 +962,15 @@
           <a:lstStyle/>
           <a:p>
             <a:r>
-              <a:rPr lang="en-US" dirty="0" err="1" smtClean="0"/>
+              <a:rPr lang="en-US" dirty="0"/>
               <a:t>Rimsha</a:t>
             </a:r>
-            <a:endParaRPr lang="en-US" dirty="0"/>
+          </a:p>
+          <a:p>
+            <a:r>
+              <a:rPr lang="en-US" dirty="0"/>
+              <a:t>- We tested what parameters performed better each time we trained the models </a:t>
+            </a:r>
           </a:p>
         </p:txBody>
       </p:sp>
@@ -970,26 +1056,22 @@
           <a:p>
             <a:pPr lvl="1"/>
             <a:r>
-              <a:rPr lang="en-US" dirty="0" smtClean="0"/>
+              <a:rPr lang="en-US" dirty="0"/>
               <a:t>Eric</a:t>
             </a:r>
           </a:p>
           <a:p>
             <a:pPr lvl="1"/>
             <a:r>
-              <a:rPr lang="en-US" dirty="0" smtClean="0"/>
+              <a:rPr lang="en-US" dirty="0"/>
               <a:t>For</a:t>
             </a:r>
             <a:r>
-              <a:rPr lang="en-US" baseline="0" dirty="0" smtClean="0"/>
-              <a:t> </a:t>
-            </a:r>
-            <a:r>
-              <a:rPr lang="en-US" baseline="0" dirty="0" smtClean="0"/>
-              <a:t>Technical - </a:t>
-            </a:r>
-            <a:r>
-              <a:rPr lang="en-US" dirty="0" smtClean="0">
+              <a:rPr lang="en-US" baseline="0" dirty="0"/>
+              <a:t> Technical - </a:t>
+            </a:r>
+            <a:r>
+              <a:rPr lang="en-US" dirty="0">
                 <a:solidFill>
                   <a:srgbClr val="FF0000"/>
                 </a:solidFill>
@@ -1000,7 +1082,7 @@
           <a:p>
             <a:pPr lvl="1"/>
             <a:r>
-              <a:rPr lang="en-US" dirty="0" smtClean="0">
+              <a:rPr lang="en-US" dirty="0">
                 <a:solidFill>
                   <a:srgbClr val="FF0000"/>
                 </a:solidFill>
@@ -1008,7 +1090,7 @@
               <a:t>Determining shape of images for </a:t>
             </a:r>
             <a:r>
-              <a:rPr lang="en-US" dirty="0" err="1" smtClean="0">
+              <a:rPr lang="en-US" dirty="0" err="1">
                 <a:solidFill>
                   <a:srgbClr val="FF0000"/>
                 </a:solidFill>
@@ -1016,7 +1098,7 @@
               <a:t>Numpy</a:t>
             </a:r>
             <a:r>
-              <a:rPr lang="en-US" dirty="0" smtClean="0">
+              <a:rPr lang="en-US" dirty="0">
                 <a:solidFill>
                   <a:srgbClr val="FF0000"/>
                 </a:solidFill>
@@ -1110,11 +1192,11 @@
               <a:buAutoNum type="arabicPeriod"/>
             </a:pPr>
             <a:r>
-              <a:rPr lang="en-US" dirty="0" smtClean="0"/>
+              <a:rPr lang="en-US" dirty="0"/>
               <a:t>Optimized</a:t>
             </a:r>
             <a:r>
-              <a:rPr lang="en-US" baseline="0" dirty="0" smtClean="0"/>
+              <a:rPr lang="en-US" baseline="0" dirty="0"/>
               <a:t> Model - Eric</a:t>
             </a:r>
           </a:p>
@@ -1123,11 +1205,11 @@
               <a:buAutoNum type="arabicPeriod"/>
             </a:pPr>
             <a:r>
-              <a:rPr lang="en-US" baseline="0" dirty="0" err="1" smtClean="0"/>
+              <a:rPr lang="en-US" baseline="0" dirty="0" err="1"/>
               <a:t>Tensorboard</a:t>
             </a:r>
             <a:r>
-              <a:rPr lang="en-US" baseline="0" dirty="0" smtClean="0"/>
+              <a:rPr lang="en-US" baseline="0" dirty="0"/>
               <a:t>, getting the right parameters – Shreya</a:t>
             </a:r>
           </a:p>
@@ -1136,7 +1218,7 @@
               <a:buAutoNum type="arabicPeriod"/>
             </a:pPr>
             <a:r>
-              <a:rPr lang="en-US" baseline="0" dirty="0" smtClean="0"/>
+              <a:rPr lang="en-US" baseline="0" dirty="0"/>
               <a:t>Flask app for image submission -Shreya</a:t>
             </a:r>
           </a:p>
@@ -1145,7 +1227,7 @@
               <a:buAutoNum type="arabicPeriod"/>
             </a:pPr>
             <a:r>
-              <a:rPr lang="en-US" baseline="0" dirty="0" smtClean="0"/>
+              <a:rPr lang="en-US" baseline="0" dirty="0"/>
               <a:t>Scraping – Andrew</a:t>
             </a:r>
           </a:p>
@@ -1153,13 +1235,22 @@
             <a:pPr marL="228600" indent="-228600">
               <a:buAutoNum type="arabicPeriod"/>
             </a:pPr>
-            <a:endParaRPr lang="en-US" baseline="0" dirty="0" smtClean="0"/>
+            <a:r>
+              <a:rPr lang="en-US" baseline="0" dirty="0"/>
+              <a:t>Video demo – Eric </a:t>
+            </a:r>
           </a:p>
           <a:p>
             <a:pPr marL="228600" indent="-228600">
               <a:buAutoNum type="arabicPeriod"/>
             </a:pPr>
-            <a:endParaRPr lang="en-US" baseline="0" dirty="0" smtClean="0"/>
+            <a:endParaRPr lang="en-US" baseline="0" dirty="0"/>
+          </a:p>
+          <a:p>
+            <a:pPr marL="228600" indent="-228600">
+              <a:buAutoNum type="arabicPeriod"/>
+            </a:pPr>
+            <a:endParaRPr lang="en-US" baseline="0" dirty="0"/>
           </a:p>
         </p:txBody>
       </p:sp>
@@ -1244,10 +1335,9 @@
           <a:lstStyle/>
           <a:p>
             <a:r>
-              <a:rPr lang="en-US" dirty="0" smtClean="0"/>
+              <a:rPr lang="en-US" dirty="0"/>
               <a:t>Andrew</a:t>
             </a:r>
-            <a:endParaRPr lang="en-US" dirty="0"/>
           </a:p>
         </p:txBody>
       </p:sp>
@@ -1865,7 +1955,7 @@
           </a:lstStyle>
           <a:p>
             <a:r>
-              <a:rPr lang="en-US" smtClean="0"/>
+              <a:rPr lang="en-US"/>
               <a:t>Click to edit Master title style</a:t>
             </a:r>
             <a:endParaRPr lang="en-US" dirty="0"/>
@@ -1985,7 +2075,7 @@
           </a:lstStyle>
           <a:p>
             <a:r>
-              <a:rPr lang="en-US" smtClean="0"/>
+              <a:rPr lang="en-US"/>
               <a:t>Click to edit Master subtitle style</a:t>
             </a:r>
             <a:endParaRPr lang="en-US" dirty="0"/>
@@ -2009,7 +2099,7 @@
           <a:p>
             <a:fld id="{E147C991-5936-49D3-B8BD-885B9AA452C4}" type="datetimeFigureOut">
               <a:rPr lang="en-US" smtClean="0"/>
-              <a:t>7/28/2020</a:t>
+              <a:t>7/29/2020</a:t>
             </a:fld>
             <a:endParaRPr lang="en-US"/>
           </a:p>
@@ -2114,7 +2204,7 @@
           </a:lstStyle>
           <a:p>
             <a:r>
-              <a:rPr lang="en-US" smtClean="0"/>
+              <a:rPr lang="en-US"/>
               <a:t>Click to edit Master title style</a:t>
             </a:r>
             <a:endParaRPr lang="en-US" dirty="0"/>
@@ -2237,7 +2327,7 @@
           <a:p>
             <a:pPr lvl="0"/>
             <a:r>
-              <a:rPr lang="en-US" smtClean="0"/>
+              <a:rPr lang="en-US"/>
               <a:t>Click to edit Master text styles</a:t>
             </a:r>
           </a:p>
@@ -2260,7 +2350,7 @@
           <a:p>
             <a:fld id="{E147C991-5936-49D3-B8BD-885B9AA452C4}" type="datetimeFigureOut">
               <a:rPr lang="en-US" smtClean="0"/>
-              <a:t>7/28/2020</a:t>
+              <a:t>7/29/2020</a:t>
             </a:fld>
             <a:endParaRPr lang="en-US"/>
           </a:p>
@@ -2365,7 +2455,7 @@
           </a:lstStyle>
           <a:p>
             <a:r>
-              <a:rPr lang="en-US" smtClean="0"/>
+              <a:rPr lang="en-US"/>
               <a:t>Click to edit Master title style</a:t>
             </a:r>
             <a:endParaRPr lang="en-US" dirty="0"/>
@@ -2429,7 +2519,7 @@
           <a:p>
             <a:pPr lvl="0"/>
             <a:r>
-              <a:rPr lang="en-US" smtClean="0"/>
+              <a:rPr lang="en-US"/>
               <a:t>Click to edit Master text styles</a:t>
             </a:r>
           </a:p>
@@ -2551,7 +2641,7 @@
           <a:p>
             <a:pPr lvl="0"/>
             <a:r>
-              <a:rPr lang="en-US" smtClean="0"/>
+              <a:rPr lang="en-US"/>
               <a:t>Click to edit Master text styles</a:t>
             </a:r>
           </a:p>
@@ -2574,7 +2664,7 @@
           <a:p>
             <a:fld id="{E147C991-5936-49D3-B8BD-885B9AA452C4}" type="datetimeFigureOut">
               <a:rPr lang="en-US" smtClean="0"/>
-              <a:t>7/28/2020</a:t>
+              <a:t>7/29/2020</a:t>
             </a:fld>
             <a:endParaRPr lang="en-US"/>
           </a:p>
@@ -2769,7 +2859,7 @@
           </a:lstStyle>
           <a:p>
             <a:r>
-              <a:rPr lang="en-US" smtClean="0"/>
+              <a:rPr lang="en-US"/>
               <a:t>Click to edit Master title style</a:t>
             </a:r>
             <a:endParaRPr lang="en-US" dirty="0"/>
@@ -2892,7 +2982,7 @@
           <a:p>
             <a:pPr lvl="0"/>
             <a:r>
-              <a:rPr lang="en-US" smtClean="0"/>
+              <a:rPr lang="en-US"/>
               <a:t>Click to edit Master text styles</a:t>
             </a:r>
           </a:p>
@@ -2915,7 +3005,7 @@
           <a:p>
             <a:fld id="{E147C991-5936-49D3-B8BD-885B9AA452C4}" type="datetimeFigureOut">
               <a:rPr lang="en-US" smtClean="0"/>
-              <a:t>7/28/2020</a:t>
+              <a:t>7/29/2020</a:t>
             </a:fld>
             <a:endParaRPr lang="en-US"/>
           </a:p>
@@ -3020,7 +3110,7 @@
           </a:lstStyle>
           <a:p>
             <a:r>
-              <a:rPr lang="en-US" smtClean="0"/>
+              <a:rPr lang="en-US"/>
               <a:t>Click to edit Master title style</a:t>
             </a:r>
             <a:endParaRPr lang="en-US" dirty="0"/>
@@ -3084,7 +3174,7 @@
           <a:p>
             <a:pPr lvl="0"/>
             <a:r>
-              <a:rPr lang="en-US" smtClean="0"/>
+              <a:rPr lang="en-US"/>
               <a:t>Click to edit Master text styles</a:t>
             </a:r>
           </a:p>
@@ -3206,7 +3296,7 @@
           <a:p>
             <a:pPr lvl="0"/>
             <a:r>
-              <a:rPr lang="en-US" smtClean="0"/>
+              <a:rPr lang="en-US"/>
               <a:t>Click to edit Master text styles</a:t>
             </a:r>
           </a:p>
@@ -3229,7 +3319,7 @@
           <a:p>
             <a:fld id="{E147C991-5936-49D3-B8BD-885B9AA452C4}" type="datetimeFigureOut">
               <a:rPr lang="en-US" smtClean="0"/>
-              <a:t>7/28/2020</a:t>
+              <a:t>7/29/2020</a:t>
             </a:fld>
             <a:endParaRPr lang="en-US"/>
           </a:p>
@@ -3416,7 +3506,7 @@
           </a:lstStyle>
           <a:p>
             <a:r>
-              <a:rPr lang="en-US" smtClean="0"/>
+              <a:rPr lang="en-US"/>
               <a:t>Click to edit Master title style</a:t>
             </a:r>
             <a:endParaRPr lang="en-US" dirty="0"/>
@@ -3477,7 +3567,7 @@
           <a:p>
             <a:pPr lvl="0"/>
             <a:r>
-              <a:rPr lang="en-US" smtClean="0"/>
+              <a:rPr lang="en-US"/>
               <a:t>Click to edit Master text styles</a:t>
             </a:r>
           </a:p>
@@ -3599,7 +3689,7 @@
           <a:p>
             <a:pPr lvl="0"/>
             <a:r>
-              <a:rPr lang="en-US" smtClean="0"/>
+              <a:rPr lang="en-US"/>
               <a:t>Click to edit Master text styles</a:t>
             </a:r>
           </a:p>
@@ -3622,7 +3712,7 @@
           <a:p>
             <a:fld id="{E147C991-5936-49D3-B8BD-885B9AA452C4}" type="datetimeFigureOut">
               <a:rPr lang="en-US" smtClean="0"/>
-              <a:t>7/28/2020</a:t>
+              <a:t>7/29/2020</a:t>
             </a:fld>
             <a:endParaRPr lang="en-US"/>
           </a:p>
@@ -3716,7 +3806,7 @@
           <a:lstStyle/>
           <a:p>
             <a:r>
-              <a:rPr lang="en-US" smtClean="0"/>
+              <a:rPr lang="en-US"/>
               <a:t>Click to edit Master title style</a:t>
             </a:r>
             <a:endParaRPr lang="en-US" dirty="0"/>
@@ -3740,35 +3830,35 @@
           <a:p>
             <a:pPr lvl="0"/>
             <a:r>
-              <a:rPr lang="en-US" smtClean="0"/>
+              <a:rPr lang="en-US"/>
               <a:t>Click to edit Master text styles</a:t>
             </a:r>
           </a:p>
           <a:p>
             <a:pPr lvl="1"/>
             <a:r>
-              <a:rPr lang="en-US" smtClean="0"/>
+              <a:rPr lang="en-US"/>
               <a:t>Second level</a:t>
             </a:r>
           </a:p>
           <a:p>
             <a:pPr lvl="2"/>
             <a:r>
-              <a:rPr lang="en-US" smtClean="0"/>
+              <a:rPr lang="en-US"/>
               <a:t>Third level</a:t>
             </a:r>
           </a:p>
           <a:p>
             <a:pPr lvl="3"/>
             <a:r>
-              <a:rPr lang="en-US" smtClean="0"/>
+              <a:rPr lang="en-US"/>
               <a:t>Fourth level</a:t>
             </a:r>
           </a:p>
           <a:p>
             <a:pPr lvl="4"/>
             <a:r>
-              <a:rPr lang="en-US" smtClean="0"/>
+              <a:rPr lang="en-US"/>
               <a:t>Fifth level</a:t>
             </a:r>
             <a:endParaRPr lang="en-US" dirty="0"/>
@@ -3792,7 +3882,7 @@
           <a:p>
             <a:fld id="{E147C991-5936-49D3-B8BD-885B9AA452C4}" type="datetimeFigureOut">
               <a:rPr lang="en-US" smtClean="0"/>
-              <a:t>7/28/2020</a:t>
+              <a:t>7/29/2020</a:t>
             </a:fld>
             <a:endParaRPr lang="en-US"/>
           </a:p>
@@ -3891,7 +3981,7 @@
           <a:lstStyle/>
           <a:p>
             <a:r>
-              <a:rPr lang="en-US" smtClean="0"/>
+              <a:rPr lang="en-US"/>
               <a:t>Click to edit Master title style</a:t>
             </a:r>
             <a:endParaRPr lang="en-US" dirty="0"/>
@@ -3920,35 +4010,35 @@
           <a:p>
             <a:pPr lvl="0"/>
             <a:r>
-              <a:rPr lang="en-US" smtClean="0"/>
+              <a:rPr lang="en-US"/>
               <a:t>Click to edit Master text styles</a:t>
             </a:r>
           </a:p>
           <a:p>
             <a:pPr lvl="1"/>
             <a:r>
-              <a:rPr lang="en-US" smtClean="0"/>
+              <a:rPr lang="en-US"/>
               <a:t>Second level</a:t>
             </a:r>
           </a:p>
           <a:p>
             <a:pPr lvl="2"/>
             <a:r>
-              <a:rPr lang="en-US" smtClean="0"/>
+              <a:rPr lang="en-US"/>
               <a:t>Third level</a:t>
             </a:r>
           </a:p>
           <a:p>
             <a:pPr lvl="3"/>
             <a:r>
-              <a:rPr lang="en-US" smtClean="0"/>
+              <a:rPr lang="en-US"/>
               <a:t>Fourth level</a:t>
             </a:r>
           </a:p>
           <a:p>
             <a:pPr lvl="4"/>
             <a:r>
-              <a:rPr lang="en-US" smtClean="0"/>
+              <a:rPr lang="en-US"/>
               <a:t>Fifth level</a:t>
             </a:r>
             <a:endParaRPr lang="en-US" dirty="0"/>
@@ -3972,7 +4062,7 @@
           <a:p>
             <a:fld id="{E147C991-5936-49D3-B8BD-885B9AA452C4}" type="datetimeFigureOut">
               <a:rPr lang="en-US" smtClean="0"/>
-              <a:t>7/28/2020</a:t>
+              <a:t>7/29/2020</a:t>
             </a:fld>
             <a:endParaRPr lang="en-US"/>
           </a:p>
@@ -4072,7 +4162,7 @@
           </a:lstStyle>
           <a:p>
             <a:r>
-              <a:rPr lang="en-US" smtClean="0"/>
+              <a:rPr lang="en-US"/>
               <a:t>Click to edit Master title style</a:t>
             </a:r>
             <a:endParaRPr lang="en-US" dirty="0"/>
@@ -4096,35 +4186,35 @@
           <a:p>
             <a:pPr lvl="0"/>
             <a:r>
-              <a:rPr lang="en-US" smtClean="0"/>
+              <a:rPr lang="en-US"/>
               <a:t>Click to edit Master text styles</a:t>
             </a:r>
           </a:p>
           <a:p>
             <a:pPr lvl="1"/>
             <a:r>
-              <a:rPr lang="en-US" smtClean="0"/>
+              <a:rPr lang="en-US"/>
               <a:t>Second level</a:t>
             </a:r>
           </a:p>
           <a:p>
             <a:pPr lvl="2"/>
             <a:r>
-              <a:rPr lang="en-US" smtClean="0"/>
+              <a:rPr lang="en-US"/>
               <a:t>Third level</a:t>
             </a:r>
           </a:p>
           <a:p>
             <a:pPr lvl="3"/>
             <a:r>
-              <a:rPr lang="en-US" smtClean="0"/>
+              <a:rPr lang="en-US"/>
               <a:t>Fourth level</a:t>
             </a:r>
           </a:p>
           <a:p>
             <a:pPr lvl="4"/>
             <a:r>
-              <a:rPr lang="en-US" smtClean="0"/>
+              <a:rPr lang="en-US"/>
               <a:t>Fifth level</a:t>
             </a:r>
             <a:endParaRPr lang="en-US" dirty="0"/>
@@ -4148,7 +4238,7 @@
           <a:p>
             <a:fld id="{E147C991-5936-49D3-B8BD-885B9AA452C4}" type="datetimeFigureOut">
               <a:rPr lang="en-US" smtClean="0"/>
-              <a:t>7/28/2020</a:t>
+              <a:t>7/29/2020</a:t>
             </a:fld>
             <a:endParaRPr lang="en-US"/>
           </a:p>
@@ -4251,7 +4341,7 @@
           </a:lstStyle>
           <a:p>
             <a:r>
-              <a:rPr lang="en-US" smtClean="0"/>
+              <a:rPr lang="en-US"/>
               <a:t>Click to edit Master title style</a:t>
             </a:r>
             <a:endParaRPr lang="en-US" dirty="0"/>
@@ -4372,7 +4462,7 @@
           <a:p>
             <a:pPr lvl="0"/>
             <a:r>
-              <a:rPr lang="en-US" smtClean="0"/>
+              <a:rPr lang="en-US"/>
               <a:t>Click to edit Master text styles</a:t>
             </a:r>
           </a:p>
@@ -4395,7 +4485,7 @@
           <a:p>
             <a:fld id="{E147C991-5936-49D3-B8BD-885B9AA452C4}" type="datetimeFigureOut">
               <a:rPr lang="en-US" smtClean="0"/>
-              <a:t>7/28/2020</a:t>
+              <a:t>7/29/2020</a:t>
             </a:fld>
             <a:endParaRPr lang="en-US"/>
           </a:p>
@@ -4489,7 +4579,7 @@
           <a:lstStyle/>
           <a:p>
             <a:r>
-              <a:rPr lang="en-US" smtClean="0"/>
+              <a:rPr lang="en-US"/>
               <a:t>Click to edit Master title style</a:t>
             </a:r>
             <a:endParaRPr lang="en-US" dirty="0"/>
@@ -4518,35 +4608,35 @@
           <a:p>
             <a:pPr lvl="0"/>
             <a:r>
-              <a:rPr lang="en-US" smtClean="0"/>
+              <a:rPr lang="en-US"/>
               <a:t>Click to edit Master text styles</a:t>
             </a:r>
           </a:p>
           <a:p>
             <a:pPr lvl="1"/>
             <a:r>
-              <a:rPr lang="en-US" smtClean="0"/>
+              <a:rPr lang="en-US"/>
               <a:t>Second level</a:t>
             </a:r>
           </a:p>
           <a:p>
             <a:pPr lvl="2"/>
             <a:r>
-              <a:rPr lang="en-US" smtClean="0"/>
+              <a:rPr lang="en-US"/>
               <a:t>Third level</a:t>
             </a:r>
           </a:p>
           <a:p>
             <a:pPr lvl="3"/>
             <a:r>
-              <a:rPr lang="en-US" smtClean="0"/>
+              <a:rPr lang="en-US"/>
               <a:t>Fourth level</a:t>
             </a:r>
           </a:p>
           <a:p>
             <a:pPr lvl="4"/>
             <a:r>
-              <a:rPr lang="en-US" smtClean="0"/>
+              <a:rPr lang="en-US"/>
               <a:t>Fifth level</a:t>
             </a:r>
             <a:endParaRPr lang="en-US" dirty="0"/>
@@ -4575,35 +4665,35 @@
           <a:p>
             <a:pPr lvl="0"/>
             <a:r>
-              <a:rPr lang="en-US" smtClean="0"/>
+              <a:rPr lang="en-US"/>
               <a:t>Click to edit Master text styles</a:t>
             </a:r>
           </a:p>
           <a:p>
             <a:pPr lvl="1"/>
             <a:r>
-              <a:rPr lang="en-US" smtClean="0"/>
+              <a:rPr lang="en-US"/>
               <a:t>Second level</a:t>
             </a:r>
           </a:p>
           <a:p>
             <a:pPr lvl="2"/>
             <a:r>
-              <a:rPr lang="en-US" smtClean="0"/>
+              <a:rPr lang="en-US"/>
               <a:t>Third level</a:t>
             </a:r>
           </a:p>
           <a:p>
             <a:pPr lvl="3"/>
             <a:r>
-              <a:rPr lang="en-US" smtClean="0"/>
+              <a:rPr lang="en-US"/>
               <a:t>Fourth level</a:t>
             </a:r>
           </a:p>
           <a:p>
             <a:pPr lvl="4"/>
             <a:r>
-              <a:rPr lang="en-US" smtClean="0"/>
+              <a:rPr lang="en-US"/>
               <a:t>Fifth level</a:t>
             </a:r>
             <a:endParaRPr lang="en-US" dirty="0"/>
@@ -4627,7 +4717,7 @@
           <a:p>
             <a:fld id="{E147C991-5936-49D3-B8BD-885B9AA452C4}" type="datetimeFigureOut">
               <a:rPr lang="en-US" smtClean="0"/>
-              <a:t>7/28/2020</a:t>
+              <a:t>7/29/2020</a:t>
             </a:fld>
             <a:endParaRPr lang="en-US"/>
           </a:p>
@@ -4725,7 +4815,7 @@
           </a:lstStyle>
           <a:p>
             <a:r>
-              <a:rPr lang="en-US" smtClean="0"/>
+              <a:rPr lang="en-US"/>
               <a:t>Click to edit Master title style</a:t>
             </a:r>
             <a:endParaRPr lang="en-US" dirty="0"/>
@@ -4793,7 +4883,7 @@
           <a:p>
             <a:pPr lvl="0"/>
             <a:r>
-              <a:rPr lang="en-US" smtClean="0"/>
+              <a:rPr lang="en-US"/>
               <a:t>Click to edit Master text styles</a:t>
             </a:r>
           </a:p>
@@ -4823,35 +4913,35 @@
           <a:p>
             <a:pPr lvl="0"/>
             <a:r>
-              <a:rPr lang="en-US" smtClean="0"/>
+              <a:rPr lang="en-US"/>
               <a:t>Click to edit Master text styles</a:t>
             </a:r>
           </a:p>
           <a:p>
             <a:pPr lvl="1"/>
             <a:r>
-              <a:rPr lang="en-US" smtClean="0"/>
+              <a:rPr lang="en-US"/>
               <a:t>Second level</a:t>
             </a:r>
           </a:p>
           <a:p>
             <a:pPr lvl="2"/>
             <a:r>
-              <a:rPr lang="en-US" smtClean="0"/>
+              <a:rPr lang="en-US"/>
               <a:t>Third level</a:t>
             </a:r>
           </a:p>
           <a:p>
             <a:pPr lvl="3"/>
             <a:r>
-              <a:rPr lang="en-US" smtClean="0"/>
+              <a:rPr lang="en-US"/>
               <a:t>Fourth level</a:t>
             </a:r>
           </a:p>
           <a:p>
             <a:pPr lvl="4"/>
             <a:r>
-              <a:rPr lang="en-US" smtClean="0"/>
+              <a:rPr lang="en-US"/>
               <a:t>Fifth level</a:t>
             </a:r>
             <a:endParaRPr lang="en-US" dirty="0"/>
@@ -4919,7 +5009,7 @@
           <a:p>
             <a:pPr lvl="0"/>
             <a:r>
-              <a:rPr lang="en-US" smtClean="0"/>
+              <a:rPr lang="en-US"/>
               <a:t>Click to edit Master text styles</a:t>
             </a:r>
           </a:p>
@@ -4949,35 +5039,35 @@
           <a:p>
             <a:pPr lvl="0"/>
             <a:r>
-              <a:rPr lang="en-US" smtClean="0"/>
+              <a:rPr lang="en-US"/>
               <a:t>Click to edit Master text styles</a:t>
             </a:r>
           </a:p>
           <a:p>
             <a:pPr lvl="1"/>
             <a:r>
-              <a:rPr lang="en-US" smtClean="0"/>
+              <a:rPr lang="en-US"/>
               <a:t>Second level</a:t>
             </a:r>
           </a:p>
           <a:p>
             <a:pPr lvl="2"/>
             <a:r>
-              <a:rPr lang="en-US" smtClean="0"/>
+              <a:rPr lang="en-US"/>
               <a:t>Third level</a:t>
             </a:r>
           </a:p>
           <a:p>
             <a:pPr lvl="3"/>
             <a:r>
-              <a:rPr lang="en-US" smtClean="0"/>
+              <a:rPr lang="en-US"/>
               <a:t>Fourth level</a:t>
             </a:r>
           </a:p>
           <a:p>
             <a:pPr lvl="4"/>
             <a:r>
-              <a:rPr lang="en-US" smtClean="0"/>
+              <a:rPr lang="en-US"/>
               <a:t>Fifth level</a:t>
             </a:r>
             <a:endParaRPr lang="en-US" dirty="0"/>
@@ -5001,7 +5091,7 @@
           <a:p>
             <a:fld id="{E147C991-5936-49D3-B8BD-885B9AA452C4}" type="datetimeFigureOut">
               <a:rPr lang="en-US" smtClean="0"/>
-              <a:t>7/28/2020</a:t>
+              <a:t>7/29/2020</a:t>
             </a:fld>
             <a:endParaRPr lang="en-US"/>
           </a:p>
@@ -5100,7 +5190,7 @@
           <a:lstStyle/>
           <a:p>
             <a:r>
-              <a:rPr lang="en-US" smtClean="0"/>
+              <a:rPr lang="en-US"/>
               <a:t>Click to edit Master title style</a:t>
             </a:r>
             <a:endParaRPr lang="en-US" dirty="0"/>
@@ -5124,7 +5214,7 @@
           <a:p>
             <a:fld id="{E147C991-5936-49D3-B8BD-885B9AA452C4}" type="datetimeFigureOut">
               <a:rPr lang="en-US" smtClean="0"/>
-              <a:t>7/28/2020</a:t>
+              <a:t>7/29/2020</a:t>
             </a:fld>
             <a:endParaRPr lang="en-US"/>
           </a:p>
@@ -5219,7 +5309,7 @@
           <a:p>
             <a:fld id="{E147C991-5936-49D3-B8BD-885B9AA452C4}" type="datetimeFigureOut">
               <a:rPr lang="en-US" smtClean="0"/>
-              <a:t>7/28/2020</a:t>
+              <a:t>7/29/2020</a:t>
             </a:fld>
             <a:endParaRPr lang="en-US"/>
           </a:p>
@@ -5324,7 +5414,7 @@
           </a:lstStyle>
           <a:p>
             <a:r>
-              <a:rPr lang="en-US" smtClean="0"/>
+              <a:rPr lang="en-US"/>
               <a:t>Click to edit Master title style</a:t>
             </a:r>
             <a:endParaRPr lang="en-US" dirty="0"/>
@@ -5355,35 +5445,35 @@
           <a:p>
             <a:pPr lvl="0"/>
             <a:r>
-              <a:rPr lang="en-US" smtClean="0"/>
+              <a:rPr lang="en-US"/>
               <a:t>Click to edit Master text styles</a:t>
             </a:r>
           </a:p>
           <a:p>
             <a:pPr lvl="1"/>
             <a:r>
-              <a:rPr lang="en-US" smtClean="0"/>
+              <a:rPr lang="en-US"/>
               <a:t>Second level</a:t>
             </a:r>
           </a:p>
           <a:p>
             <a:pPr lvl="2"/>
             <a:r>
-              <a:rPr lang="en-US" smtClean="0"/>
+              <a:rPr lang="en-US"/>
               <a:t>Third level</a:t>
             </a:r>
           </a:p>
           <a:p>
             <a:pPr lvl="3"/>
             <a:r>
-              <a:rPr lang="en-US" smtClean="0"/>
+              <a:rPr lang="en-US"/>
               <a:t>Fourth level</a:t>
             </a:r>
           </a:p>
           <a:p>
             <a:pPr lvl="4"/>
             <a:r>
-              <a:rPr lang="en-US" smtClean="0"/>
+              <a:rPr lang="en-US"/>
               <a:t>Fifth level</a:t>
             </a:r>
             <a:endParaRPr lang="en-US" dirty="0"/>
@@ -5451,7 +5541,7 @@
           <a:p>
             <a:pPr lvl="0"/>
             <a:r>
-              <a:rPr lang="en-US" smtClean="0"/>
+              <a:rPr lang="en-US"/>
               <a:t>Click to edit Master text styles</a:t>
             </a:r>
           </a:p>
@@ -5474,7 +5564,7 @@
           <a:p>
             <a:fld id="{E147C991-5936-49D3-B8BD-885B9AA452C4}" type="datetimeFigureOut">
               <a:rPr lang="en-US" smtClean="0"/>
-              <a:t>7/28/2020</a:t>
+              <a:t>7/29/2020</a:t>
             </a:fld>
             <a:endParaRPr lang="en-US"/>
           </a:p>
@@ -5579,7 +5669,7 @@
           </a:lstStyle>
           <a:p>
             <a:r>
-              <a:rPr lang="en-US" smtClean="0"/>
+              <a:rPr lang="en-US"/>
               <a:t>Click to edit Master title style</a:t>
             </a:r>
             <a:endParaRPr lang="en-US" dirty="0"/>
@@ -5646,7 +5736,7 @@
           </a:lstStyle>
           <a:p>
             <a:r>
-              <a:rPr lang="en-US" smtClean="0"/>
+              <a:rPr lang="en-US"/>
               <a:t>Click icon to add picture</a:t>
             </a:r>
             <a:endParaRPr lang="en-US" dirty="0"/>
@@ -5714,7 +5804,7 @@
           <a:p>
             <a:pPr lvl="0"/>
             <a:r>
-              <a:rPr lang="en-US" smtClean="0"/>
+              <a:rPr lang="en-US"/>
               <a:t>Click to edit Master text styles</a:t>
             </a:r>
           </a:p>
@@ -5737,7 +5827,7 @@
           <a:p>
             <a:fld id="{E147C991-5936-49D3-B8BD-885B9AA452C4}" type="datetimeFigureOut">
               <a:rPr lang="en-US" smtClean="0"/>
-              <a:t>7/28/2020</a:t>
+              <a:t>7/29/2020</a:t>
             </a:fld>
             <a:endParaRPr lang="en-US"/>
           </a:p>
@@ -6376,7 +6466,7 @@
           <a:lstStyle/>
           <a:p>
             <a:r>
-              <a:rPr lang="en-US" smtClean="0"/>
+              <a:rPr lang="en-US"/>
               <a:t>Click to edit Master title style</a:t>
             </a:r>
             <a:endParaRPr lang="en-US" dirty="0"/>
@@ -6410,35 +6500,35 @@
           <a:p>
             <a:pPr lvl="0"/>
             <a:r>
-              <a:rPr lang="en-US" smtClean="0"/>
+              <a:rPr lang="en-US"/>
               <a:t>Click to edit Master text styles</a:t>
             </a:r>
           </a:p>
           <a:p>
             <a:pPr lvl="1"/>
             <a:r>
-              <a:rPr lang="en-US" smtClean="0"/>
+              <a:rPr lang="en-US"/>
               <a:t>Second level</a:t>
             </a:r>
           </a:p>
           <a:p>
             <a:pPr lvl="2"/>
             <a:r>
-              <a:rPr lang="en-US" smtClean="0"/>
+              <a:rPr lang="en-US"/>
               <a:t>Third level</a:t>
             </a:r>
           </a:p>
           <a:p>
             <a:pPr lvl="3"/>
             <a:r>
-              <a:rPr lang="en-US" smtClean="0"/>
+              <a:rPr lang="en-US"/>
               <a:t>Fourth level</a:t>
             </a:r>
           </a:p>
           <a:p>
             <a:pPr lvl="4"/>
             <a:r>
-              <a:rPr lang="en-US" smtClean="0"/>
+              <a:rPr lang="en-US"/>
               <a:t>Fifth level</a:t>
             </a:r>
             <a:endParaRPr lang="en-US" dirty="0"/>
@@ -6480,7 +6570,7 @@
           <a:p>
             <a:fld id="{E147C991-5936-49D3-B8BD-885B9AA452C4}" type="datetimeFigureOut">
               <a:rPr lang="en-US" smtClean="0"/>
-              <a:t>7/28/2020</a:t>
+              <a:t>7/29/2020</a:t>
             </a:fld>
             <a:endParaRPr lang="en-US"/>
           </a:p>
@@ -7021,10 +7111,9 @@
           <a:p>
             <a:pPr algn="l"/>
             <a:r>
-              <a:rPr lang="en-US" dirty="0" smtClean="0"/>
+              <a:rPr lang="en-US" dirty="0"/>
               <a:t>Identifying Cars with CNN</a:t>
             </a:r>
-            <a:endParaRPr lang="en-US" dirty="0"/>
           </a:p>
         </p:txBody>
       </p:sp>
@@ -7045,31 +7134,27 @@
           <a:p>
             <a:pPr algn="l"/>
             <a:r>
-              <a:rPr lang="en-US" dirty="0" smtClean="0"/>
+              <a:rPr lang="en-US" dirty="0"/>
               <a:t>Andrew </a:t>
             </a:r>
             <a:r>
               <a:rPr lang="en-US" dirty="0" err="1"/>
-              <a:t>M</a:t>
-            </a:r>
-            <a:r>
-              <a:rPr lang="en-US" dirty="0" err="1" smtClean="0"/>
-              <a:t>aximos</a:t>
-            </a:r>
-            <a:r>
-              <a:rPr lang="en-US" dirty="0" smtClean="0"/>
+              <a:t>Maximos</a:t>
+            </a:r>
+            <a:r>
+              <a:rPr lang="en-US" dirty="0"/>
               <a:t>, Eric Pacheco, </a:t>
             </a:r>
             <a:r>
-              <a:rPr lang="en-US" dirty="0" err="1" smtClean="0"/>
+              <a:rPr lang="en-US" dirty="0" err="1"/>
               <a:t>Rimsha</a:t>
             </a:r>
             <a:r>
-              <a:rPr lang="en-US" dirty="0" smtClean="0"/>
+              <a:rPr lang="en-US" dirty="0"/>
               <a:t> Aziz, Shreya </a:t>
             </a:r>
             <a:r>
-              <a:rPr lang="en-US" dirty="0" err="1" smtClean="0"/>
+              <a:rPr lang="en-US" dirty="0" err="1"/>
               <a:t>Sachdev</a:t>
             </a:r>
             <a:endParaRPr lang="en-US" dirty="0"/>
@@ -7122,10 +7207,9 @@
           <a:lstStyle/>
           <a:p>
             <a:r>
-              <a:rPr lang="en-US" dirty="0" smtClean="0"/>
+              <a:rPr lang="en-US" dirty="0"/>
               <a:t>CNN Overview</a:t>
             </a:r>
-            <a:endParaRPr lang="en-US" dirty="0"/>
           </a:p>
         </p:txBody>
       </p:sp>
@@ -7145,19 +7229,19 @@
           <a:lstStyle/>
           <a:p>
             <a:r>
-              <a:rPr lang="en-US" dirty="0" smtClean="0"/>
+              <a:rPr lang="en-US" dirty="0"/>
               <a:t>Integral to image classification when building machine learning models</a:t>
             </a:r>
           </a:p>
           <a:p>
             <a:r>
-              <a:rPr lang="en-US" dirty="0" smtClean="0"/>
+              <a:rPr lang="en-US" dirty="0"/>
               <a:t>Breaks down image into smaller portions to filter noise</a:t>
             </a:r>
           </a:p>
           <a:p>
             <a:r>
-              <a:rPr lang="en-US" dirty="0" smtClean="0"/>
+              <a:rPr lang="en-US" dirty="0"/>
               <a:t>Detects patterns and objects within similar images</a:t>
             </a:r>
           </a:p>
@@ -7220,10 +7304,9 @@
           <a:lstStyle/>
           <a:p>
             <a:r>
-              <a:rPr lang="en-US" dirty="0" smtClean="0"/>
+              <a:rPr lang="en-US" dirty="0"/>
               <a:t>What We Did</a:t>
             </a:r>
-            <a:endParaRPr lang="en-US" dirty="0"/>
           </a:p>
         </p:txBody>
       </p:sp>
@@ -7247,23 +7330,16 @@
               <a:buAutoNum type="arabicPeriod"/>
             </a:pPr>
             <a:r>
-              <a:rPr lang="en-US" dirty="0" smtClean="0"/>
+              <a:rPr lang="en-US" dirty="0"/>
               <a:t>Train model from </a:t>
             </a:r>
             <a:r>
-              <a:rPr lang="en-US" dirty="0" err="1" smtClean="0"/>
+              <a:rPr lang="en-US" dirty="0" err="1"/>
               <a:t>Kaggle</a:t>
             </a:r>
             <a:r>
-              <a:rPr lang="en-US" dirty="0" smtClean="0"/>
+              <a:rPr lang="en-US" dirty="0"/>
               <a:t> library of various cars</a:t>
-            </a:r>
-          </a:p>
-          <a:p>
-            <a:pPr lvl="1"/>
-            <a:r>
-              <a:rPr lang="en-US" dirty="0" smtClean="0"/>
-              <a:t>Pandas</a:t>
             </a:r>
           </a:p>
           <a:p>
@@ -7272,17 +7348,17 @@
               <a:buAutoNum type="arabicPeriod"/>
             </a:pPr>
             <a:r>
-              <a:rPr lang="en-US" dirty="0" smtClean="0"/>
+              <a:rPr lang="en-US" dirty="0"/>
               <a:t>Send pictures from webcam to model for prediction</a:t>
             </a:r>
           </a:p>
           <a:p>
             <a:pPr lvl="1"/>
             <a:r>
-              <a:rPr lang="en-US" dirty="0" err="1" smtClean="0"/>
+              <a:rPr lang="en-US" dirty="0" err="1"/>
               <a:t>OpenCV</a:t>
             </a:r>
-            <a:endParaRPr lang="en-US" dirty="0" smtClean="0"/>
+            <a:endParaRPr lang="en-US" dirty="0"/>
           </a:p>
           <a:p>
             <a:pPr marL="514350" indent="-514350">
@@ -7290,14 +7366,14 @@
               <a:buAutoNum type="arabicPeriod"/>
             </a:pPr>
             <a:r>
-              <a:rPr lang="en-US" dirty="0" smtClean="0"/>
+              <a:rPr lang="en-US" dirty="0"/>
               <a:t>Upload pictures from webpage to model for prediction</a:t>
             </a:r>
           </a:p>
           <a:p>
             <a:pPr lvl="1"/>
             <a:r>
-              <a:rPr lang="en-US" dirty="0" smtClean="0"/>
+              <a:rPr lang="en-US" dirty="0"/>
               <a:t>Flask, HTML</a:t>
             </a:r>
           </a:p>
@@ -7307,14 +7383,14 @@
               <a:buAutoNum type="arabicPeriod"/>
             </a:pPr>
             <a:r>
-              <a:rPr lang="en-US" dirty="0" smtClean="0"/>
+              <a:rPr lang="en-US" dirty="0"/>
               <a:t>Scrape images from auto trader to model for prediction</a:t>
             </a:r>
           </a:p>
           <a:p>
             <a:pPr lvl="1"/>
             <a:r>
-              <a:rPr lang="en-US" dirty="0" smtClean="0"/>
+              <a:rPr lang="en-US" dirty="0"/>
               <a:t>Flask</a:t>
             </a:r>
           </a:p>
@@ -7366,10 +7442,9 @@
           <a:lstStyle/>
           <a:p>
             <a:r>
-              <a:rPr lang="en-US" dirty="0" smtClean="0"/>
+              <a:rPr lang="en-US" dirty="0"/>
               <a:t>Ambitions</a:t>
             </a:r>
-            <a:endParaRPr lang="en-US" dirty="0"/>
           </a:p>
         </p:txBody>
       </p:sp>
@@ -7389,30 +7464,29 @@
           <a:lstStyle/>
           <a:p>
             <a:r>
-              <a:rPr lang="en-US" dirty="0" smtClean="0"/>
+              <a:rPr lang="en-US" dirty="0"/>
               <a:t>Accurately identify 42 classes of cars</a:t>
             </a:r>
           </a:p>
           <a:p>
             <a:pPr lvl="1"/>
             <a:r>
-              <a:rPr lang="en-US" dirty="0" smtClean="0"/>
+              <a:rPr lang="en-US" dirty="0"/>
               <a:t>Low accuracy</a:t>
             </a:r>
           </a:p>
           <a:p>
             <a:r>
-              <a:rPr lang="en-US" dirty="0" smtClean="0"/>
+              <a:rPr lang="en-US" dirty="0"/>
               <a:t>AWS buckets to store images</a:t>
             </a:r>
           </a:p>
           <a:p>
             <a:pPr lvl="1"/>
             <a:r>
-              <a:rPr lang="en-US" dirty="0" smtClean="0"/>
+              <a:rPr lang="en-US" dirty="0"/>
               <a:t>Too many photos and $$</a:t>
             </a:r>
-            <a:endParaRPr lang="en-US" dirty="0"/>
           </a:p>
           <a:p>
             <a:r>
@@ -7425,17 +7499,13 @@
             </a:r>
             <a:r>
               <a:rPr lang="en-US" dirty="0"/>
-              <a:t> </a:t>
-            </a:r>
-            <a:r>
-              <a:rPr lang="en-US" dirty="0" smtClean="0"/>
-              <a:t>images</a:t>
+              <a:t> images</a:t>
             </a:r>
           </a:p>
           <a:p>
             <a:pPr lvl="1"/>
             <a:r>
-              <a:rPr lang="en-US" dirty="0" smtClean="0"/>
+              <a:rPr lang="en-US" dirty="0"/>
               <a:t>Too much variance, mostly pictures from interior</a:t>
             </a:r>
           </a:p>
@@ -7487,10 +7557,9 @@
           <a:lstStyle/>
           <a:p>
             <a:r>
-              <a:rPr lang="en-US" dirty="0" smtClean="0"/>
+              <a:rPr lang="en-US" dirty="0"/>
               <a:t>Results</a:t>
             </a:r>
-            <a:endParaRPr lang="en-US" dirty="0"/>
           </a:p>
         </p:txBody>
       </p:sp>
@@ -7517,61 +7586,8 @@
           <a:lstStyle/>
           <a:p>
             <a:r>
-              <a:rPr lang="en-US" dirty="0" smtClean="0"/>
-              <a:t>Our </a:t>
-            </a:r>
-            <a:r>
-              <a:rPr lang="en-US" dirty="0" smtClean="0"/>
-              <a:t>most accurate model </a:t>
-            </a:r>
-            <a:r>
-              <a:rPr lang="en-US" dirty="0" smtClean="0"/>
-              <a:t>can identify cars with </a:t>
-            </a:r>
-            <a:r>
-              <a:rPr lang="en-US" dirty="0" smtClean="0">
-                <a:solidFill>
-                  <a:srgbClr val="FF0000"/>
-                </a:solidFill>
-              </a:rPr>
-              <a:t>85%</a:t>
-            </a:r>
-            <a:r>
-              <a:rPr lang="en-US" dirty="0" smtClean="0">
-                <a:solidFill>
-                  <a:srgbClr val="FF0000"/>
-                </a:solidFill>
-              </a:rPr>
-              <a:t> </a:t>
-            </a:r>
-            <a:r>
-              <a:rPr lang="en-US" dirty="0" smtClean="0"/>
-              <a:t>accuracy for the </a:t>
-            </a:r>
-            <a:r>
-              <a:rPr lang="en-US" dirty="0" smtClean="0"/>
-              <a:t>2 car makes, Mazda and Jeep.</a:t>
-            </a:r>
-          </a:p>
-          <a:p>
-            <a:endParaRPr lang="en-US" dirty="0"/>
-          </a:p>
-          <a:p>
-            <a:r>
-              <a:rPr lang="en-US" dirty="0" smtClean="0"/>
-              <a:t>Our original model </a:t>
-            </a:r>
-            <a:r>
               <a:rPr lang="en-US" dirty="0"/>
-              <a:t>can identify cars with </a:t>
-            </a:r>
-            <a:r>
-              <a:rPr lang="en-US" dirty="0" smtClean="0">
-                <a:solidFill>
-                  <a:srgbClr val="FF0000"/>
-                </a:solidFill>
-              </a:rPr>
-              <a:t>55</a:t>
+              <a:t>Our most accurate model can identify cars with </a:t>
             </a:r>
             <a:r>
               <a:rPr lang="en-US" dirty="0">
@@ -7579,17 +7595,33 @@
                   <a:srgbClr val="FF0000"/>
                 </a:solidFill>
               </a:rPr>
-              <a:t>% </a:t>
+              <a:t>85% </a:t>
             </a:r>
             <a:r>
               <a:rPr lang="en-US" dirty="0"/>
-              <a:t>accuracy </a:t>
-            </a:r>
-            <a:r>
-              <a:rPr lang="en-US" dirty="0" smtClean="0"/>
-              <a:t>for 42 different car makes.</a:t>
-            </a:r>
-            <a:endParaRPr lang="en-US" dirty="0" smtClean="0"/>
+              <a:t>accuracy for the 2 car makes, Mazda and Jeep.</a:t>
+            </a:r>
+          </a:p>
+          <a:p>
+            <a:endParaRPr lang="en-US" dirty="0"/>
+          </a:p>
+          <a:p>
+            <a:r>
+              <a:rPr lang="en-US" dirty="0"/>
+              <a:t>Our original model can identify cars with </a:t>
+            </a:r>
+            <a:r>
+              <a:rPr lang="en-US" dirty="0">
+                <a:solidFill>
+                  <a:srgbClr val="FF0000"/>
+                </a:solidFill>
+              </a:rPr>
+              <a:t>55% </a:t>
+            </a:r>
+            <a:r>
+              <a:rPr lang="en-US" dirty="0"/>
+              <a:t>accuracy for 42 different car makes.</a:t>
+            </a:r>
           </a:p>
         </p:txBody>
       </p:sp>
@@ -7639,10 +7671,9 @@
           <a:lstStyle/>
           <a:p>
             <a:r>
-              <a:rPr lang="en-US" dirty="0" smtClean="0"/>
+              <a:rPr lang="en-US" dirty="0"/>
               <a:t>Problems with CNN</a:t>
             </a:r>
-            <a:endParaRPr lang="en-US" dirty="0"/>
           </a:p>
         </p:txBody>
       </p:sp>
@@ -7662,50 +7693,45 @@
           <a:lstStyle/>
           <a:p>
             <a:r>
-              <a:rPr lang="en-US" dirty="0" smtClean="0"/>
+              <a:rPr lang="en-US" dirty="0"/>
               <a:t>Too many images for repo and AWS, computer crashed!</a:t>
             </a:r>
           </a:p>
           <a:p>
             <a:r>
-              <a:rPr lang="en-US" dirty="0" smtClean="0"/>
+              <a:rPr lang="en-US" dirty="0"/>
               <a:t>*Cars look too similar to each other*</a:t>
             </a:r>
           </a:p>
           <a:p>
             <a:r>
-              <a:rPr lang="en-US" dirty="0" smtClean="0"/>
+              <a:rPr lang="en-US" dirty="0"/>
               <a:t>Took 3 days to train</a:t>
             </a:r>
           </a:p>
           <a:p>
             <a:r>
-              <a:rPr lang="en-US" dirty="0" smtClean="0"/>
+              <a:rPr lang="en-US" dirty="0"/>
               <a:t>Overfitting</a:t>
             </a:r>
           </a:p>
           <a:p>
             <a:r>
-              <a:rPr lang="en-US" dirty="0" smtClean="0"/>
-              <a:t>Image data generator caused memory </a:t>
-            </a:r>
-            <a:r>
-              <a:rPr lang="en-US" dirty="0" smtClean="0"/>
-              <a:t>issues</a:t>
-            </a:r>
-          </a:p>
-          <a:p>
-            <a:r>
-              <a:rPr lang="en-US" dirty="0" smtClean="0"/>
+              <a:rPr lang="en-US" dirty="0"/>
+              <a:t>Image data generator caused memory issues</a:t>
+            </a:r>
+          </a:p>
+          <a:p>
+            <a:r>
+              <a:rPr lang="en-US" dirty="0"/>
               <a:t>Unequal number of car images between makes</a:t>
             </a:r>
           </a:p>
           <a:p>
             <a:r>
-              <a:rPr lang="en-US" dirty="0" smtClean="0"/>
+              <a:rPr lang="en-US" dirty="0"/>
               <a:t>Not enough images</a:t>
             </a:r>
-            <a:endParaRPr lang="en-US" dirty="0" smtClean="0"/>
           </a:p>
         </p:txBody>
       </p:sp>
@@ -7755,10 +7781,9 @@
           <a:lstStyle/>
           <a:p>
             <a:r>
-              <a:rPr lang="en-US" dirty="0" smtClean="0"/>
+              <a:rPr lang="en-US" dirty="0"/>
               <a:t>WALKTHROUGH</a:t>
             </a:r>
-            <a:endParaRPr lang="en-US" dirty="0"/>
           </a:p>
         </p:txBody>
       </p:sp>
@@ -7808,10 +7833,9 @@
           <a:lstStyle/>
           <a:p>
             <a:r>
-              <a:rPr lang="en-US" dirty="0" smtClean="0"/>
+              <a:rPr lang="en-US" dirty="0"/>
               <a:t>Potential Next Steps</a:t>
             </a:r>
-            <a:endParaRPr lang="en-US" dirty="0"/>
           </a:p>
         </p:txBody>
       </p:sp>
@@ -7832,29 +7856,24 @@
           <a:p>
             <a:r>
               <a:rPr lang="en-US" dirty="0"/>
-              <a:t>Recognizing Cars from </a:t>
-            </a:r>
-            <a:r>
-              <a:rPr lang="en-US" dirty="0" smtClean="0"/>
-              <a:t>street view footage</a:t>
-            </a:r>
-            <a:endParaRPr lang="en-US" dirty="0"/>
-          </a:p>
-          <a:p>
-            <a:r>
-              <a:rPr lang="en-US" dirty="0" smtClean="0"/>
+              <a:t>Recognizing Cars from street view footage</a:t>
+            </a:r>
+          </a:p>
+          <a:p>
+            <a:r>
+              <a:rPr lang="en-US" dirty="0"/>
               <a:t>Increase accuracy of model recognizing 42 cars</a:t>
             </a:r>
           </a:p>
           <a:p>
             <a:r>
-              <a:rPr lang="en-US" dirty="0" smtClean="0"/>
+              <a:rPr lang="en-US" dirty="0"/>
               <a:t>Using AWS buckets to collect and store more images</a:t>
             </a:r>
           </a:p>
           <a:p>
             <a:r>
-              <a:rPr lang="en-US" dirty="0" smtClean="0"/>
+              <a:rPr lang="en-US" dirty="0"/>
               <a:t>Has useful real-world application</a:t>
             </a:r>
           </a:p>

</xml_diff>